<commit_message>
UI improvements ; gesture carousel finished
</commit_message>
<xml_diff>
--- a/assets/data/gestures-illustrations/Gestures.pptx
+++ b/assets/data/gestures-illustrations/Gestures.pptx
@@ -6,7 +6,9 @@
   </p:sldMasterIdLst>
   <p:sldIdLst>
     <p:sldId id="256" r:id="rId2"/>
-    <p:sldId id="257" r:id="rId3"/>
+    <p:sldId id="259" r:id="rId3"/>
+    <p:sldId id="258" r:id="rId4"/>
+    <p:sldId id="257" r:id="rId5"/>
   </p:sldIdLst>
   <p:sldSz cx="12192000" cy="6858000"/>
   <p:notesSz cx="6858000" cy="9144000"/>
@@ -105,6 +107,11 @@
       </a:defRPr>
     </a:lvl9pPr>
   </p:defaultTextStyle>
+  <p:extLst>
+    <p:ext uri="{EFAFB233-063F-42B5-8137-9DF3F51BA10A}">
+      <p15:sldGuideLst xmlns:p15="http://schemas.microsoft.com/office/powerpoint/2012/main"/>
+    </p:ext>
+  </p:extLst>
 </p:presentation>
 </file>
 
@@ -257,7 +264,7 @@
           <a:p>
             <a:fld id="{BC4ACD7B-8CAB-4BF0-9D4C-79690CEDD74C}" type="datetimeFigureOut">
               <a:rPr lang="fr-BE" smtClean="0"/>
-              <a:t>08-11-20</a:t>
+              <a:t>18-11-20</a:t>
             </a:fld>
             <a:endParaRPr lang="fr-BE"/>
           </a:p>
@@ -457,7 +464,7 @@
           <a:p>
             <a:fld id="{BC4ACD7B-8CAB-4BF0-9D4C-79690CEDD74C}" type="datetimeFigureOut">
               <a:rPr lang="fr-BE" smtClean="0"/>
-              <a:t>08-11-20</a:t>
+              <a:t>18-11-20</a:t>
             </a:fld>
             <a:endParaRPr lang="fr-BE"/>
           </a:p>
@@ -667,7 +674,7 @@
           <a:p>
             <a:fld id="{BC4ACD7B-8CAB-4BF0-9D4C-79690CEDD74C}" type="datetimeFigureOut">
               <a:rPr lang="fr-BE" smtClean="0"/>
-              <a:t>08-11-20</a:t>
+              <a:t>18-11-20</a:t>
             </a:fld>
             <a:endParaRPr lang="fr-BE"/>
           </a:p>
@@ -867,7 +874,7 @@
           <a:p>
             <a:fld id="{BC4ACD7B-8CAB-4BF0-9D4C-79690CEDD74C}" type="datetimeFigureOut">
               <a:rPr lang="fr-BE" smtClean="0"/>
-              <a:t>08-11-20</a:t>
+              <a:t>18-11-20</a:t>
             </a:fld>
             <a:endParaRPr lang="fr-BE"/>
           </a:p>
@@ -1143,7 +1150,7 @@
           <a:p>
             <a:fld id="{BC4ACD7B-8CAB-4BF0-9D4C-79690CEDD74C}" type="datetimeFigureOut">
               <a:rPr lang="fr-BE" smtClean="0"/>
-              <a:t>08-11-20</a:t>
+              <a:t>18-11-20</a:t>
             </a:fld>
             <a:endParaRPr lang="fr-BE"/>
           </a:p>
@@ -1411,7 +1418,7 @@
           <a:p>
             <a:fld id="{BC4ACD7B-8CAB-4BF0-9D4C-79690CEDD74C}" type="datetimeFigureOut">
               <a:rPr lang="fr-BE" smtClean="0"/>
-              <a:t>08-11-20</a:t>
+              <a:t>18-11-20</a:t>
             </a:fld>
             <a:endParaRPr lang="fr-BE"/>
           </a:p>
@@ -1826,7 +1833,7 @@
           <a:p>
             <a:fld id="{BC4ACD7B-8CAB-4BF0-9D4C-79690CEDD74C}" type="datetimeFigureOut">
               <a:rPr lang="fr-BE" smtClean="0"/>
-              <a:t>08-11-20</a:t>
+              <a:t>18-11-20</a:t>
             </a:fld>
             <a:endParaRPr lang="fr-BE"/>
           </a:p>
@@ -1968,7 +1975,7 @@
           <a:p>
             <a:fld id="{BC4ACD7B-8CAB-4BF0-9D4C-79690CEDD74C}" type="datetimeFigureOut">
               <a:rPr lang="fr-BE" smtClean="0"/>
-              <a:t>08-11-20</a:t>
+              <a:t>18-11-20</a:t>
             </a:fld>
             <a:endParaRPr lang="fr-BE"/>
           </a:p>
@@ -2081,7 +2088,7 @@
           <a:p>
             <a:fld id="{BC4ACD7B-8CAB-4BF0-9D4C-79690CEDD74C}" type="datetimeFigureOut">
               <a:rPr lang="fr-BE" smtClean="0"/>
-              <a:t>08-11-20</a:t>
+              <a:t>18-11-20</a:t>
             </a:fld>
             <a:endParaRPr lang="fr-BE"/>
           </a:p>
@@ -2394,7 +2401,7 @@
           <a:p>
             <a:fld id="{BC4ACD7B-8CAB-4BF0-9D4C-79690CEDD74C}" type="datetimeFigureOut">
               <a:rPr lang="fr-BE" smtClean="0"/>
-              <a:t>08-11-20</a:t>
+              <a:t>18-11-20</a:t>
             </a:fld>
             <a:endParaRPr lang="fr-BE"/>
           </a:p>
@@ -2683,7 +2690,7 @@
           <a:p>
             <a:fld id="{BC4ACD7B-8CAB-4BF0-9D4C-79690CEDD74C}" type="datetimeFigureOut">
               <a:rPr lang="fr-BE" smtClean="0"/>
-              <a:t>08-11-20</a:t>
+              <a:t>18-11-20</a:t>
             </a:fld>
             <a:endParaRPr lang="fr-BE"/>
           </a:p>
@@ -2926,7 +2933,7 @@
           <a:p>
             <a:fld id="{BC4ACD7B-8CAB-4BF0-9D4C-79690CEDD74C}" type="datetimeFigureOut">
               <a:rPr lang="fr-BE" smtClean="0"/>
-              <a:t>08-11-20</a:t>
+              <a:t>18-11-20</a:t>
             </a:fld>
             <a:endParaRPr lang="fr-BE"/>
           </a:p>
@@ -3343,12 +3350,68 @@
           <a:chExt cx="0" cy="0"/>
         </a:xfrm>
       </p:grpSpPr>
+      <p:sp>
+        <p:nvSpPr>
+          <p:cNvPr id="2" name="Rectangle 1">
+            <a:extLst>
+              <a:ext uri="{FF2B5EF4-FFF2-40B4-BE49-F238E27FC236}">
+                <a16:creationId xmlns:a16="http://schemas.microsoft.com/office/drawing/2014/main" id="{E284189C-C07B-45D3-BC9B-745661C5E876}"/>
+              </a:ext>
+            </a:extLst>
+          </p:cNvPr>
+          <p:cNvSpPr/>
+          <p:nvPr/>
+        </p:nvSpPr>
+        <p:spPr>
+          <a:xfrm>
+            <a:off x="5068137" y="2033470"/>
+            <a:ext cx="2520000" cy="2520000"/>
+          </a:xfrm>
+          <a:prstGeom prst="rect">
+            <a:avLst/>
+          </a:prstGeom>
+          <a:solidFill>
+            <a:schemeClr val="bg1"/>
+          </a:solidFill>
+          <a:ln>
+            <a:solidFill>
+              <a:schemeClr val="bg1">
+                <a:lumMod val="95000"/>
+              </a:schemeClr>
+            </a:solidFill>
+          </a:ln>
+        </p:spPr>
+        <p:style>
+          <a:lnRef idx="2">
+            <a:schemeClr val="accent1">
+              <a:shade val="50000"/>
+            </a:schemeClr>
+          </a:lnRef>
+          <a:fillRef idx="1">
+            <a:schemeClr val="accent1"/>
+          </a:fillRef>
+          <a:effectRef idx="0">
+            <a:schemeClr val="accent1"/>
+          </a:effectRef>
+          <a:fontRef idx="minor">
+            <a:schemeClr val="lt1"/>
+          </a:fontRef>
+        </p:style>
+        <p:txBody>
+          <a:bodyPr rtlCol="0" anchor="ctr"/>
+          <a:lstStyle/>
+          <a:p>
+            <a:pPr algn="ctr"/>
+            <a:endParaRPr lang="fr-BE" dirty="0"/>
+          </a:p>
+        </p:txBody>
+      </p:sp>
       <p:grpSp>
         <p:nvGrpSpPr>
-          <p:cNvPr id="7" name="Groupe 6">
-            <a:extLst>
-              <a:ext uri="{FF2B5EF4-FFF2-40B4-BE49-F238E27FC236}">
-                <a16:creationId xmlns:a16="http://schemas.microsoft.com/office/drawing/2014/main" id="{5BF0B263-D6DE-493C-B86F-2FC73F2F9FC4}"/>
+          <p:cNvPr id="16" name="Groupe 15">
+            <a:extLst>
+              <a:ext uri="{FF2B5EF4-FFF2-40B4-BE49-F238E27FC236}">
+                <a16:creationId xmlns:a16="http://schemas.microsoft.com/office/drawing/2014/main" id="{CDADB451-CA6F-4425-94AC-CD0C5EFA27E6}"/>
               </a:ext>
             </a:extLst>
           </p:cNvPr>
@@ -3357,18 +3420,18 @@
         </p:nvGrpSpPr>
         <p:grpSpPr>
           <a:xfrm>
-            <a:off x="5230511" y="1918507"/>
-            <a:ext cx="1730978" cy="3020985"/>
-            <a:chOff x="5299742" y="2291786"/>
-            <a:chExt cx="1104052" cy="1926844"/>
+            <a:off x="6111312" y="2196990"/>
+            <a:ext cx="461986" cy="461665"/>
+            <a:chOff x="6111312" y="2196990"/>
+            <a:chExt cx="461986" cy="461665"/>
           </a:xfrm>
         </p:grpSpPr>
         <p:sp>
           <p:nvSpPr>
-            <p:cNvPr id="6" name="Flèche : double flèche horizontale 5">
+            <p:cNvPr id="12" name="Ellipse 11">
               <a:extLst>
                 <a:ext uri="{FF2B5EF4-FFF2-40B4-BE49-F238E27FC236}">
-                  <a16:creationId xmlns:a16="http://schemas.microsoft.com/office/drawing/2014/main" id="{7611D091-F330-4564-A00D-463A3FBB5A3B}"/>
+                  <a16:creationId xmlns:a16="http://schemas.microsoft.com/office/drawing/2014/main" id="{38602DEB-B063-4A6F-933F-83DA891DF812}"/>
                 </a:ext>
               </a:extLst>
             </p:cNvPr>
@@ -3376,18 +3439,18 @@
             <p:nvPr/>
           </p:nvSpPr>
           <p:spPr>
-            <a:xfrm rot="16200000">
-              <a:off x="5036410" y="3159037"/>
-              <a:ext cx="1926844" cy="192341"/>
+            <a:xfrm>
+              <a:off x="6120765" y="2228775"/>
+              <a:ext cx="414744" cy="414744"/>
             </a:xfrm>
-            <a:prstGeom prst="leftRightArrow">
-              <a:avLst>
-                <a:gd name="adj1" fmla="val 26141"/>
-                <a:gd name="adj2" fmla="val 58639"/>
-              </a:avLst>
+            <a:prstGeom prst="ellipse">
+              <a:avLst/>
             </a:prstGeom>
             <a:solidFill>
-              <a:schemeClr val="tx1"/>
+              <a:schemeClr val="tx1">
+                <a:lumMod val="75000"/>
+                <a:lumOff val="25000"/>
+              </a:schemeClr>
             </a:solidFill>
             <a:ln>
               <a:noFill/>
@@ -3414,49 +3477,61 @@
             <a:lstStyle/>
             <a:p>
               <a:pPr algn="ctr"/>
-              <a:endParaRPr lang="fr-BE"/>
+              <a:endParaRPr lang="fr-BE" sz="600" dirty="0">
+                <a:latin typeface="Bauhaus 93" panose="04030905020B02020C02" pitchFamily="82" charset="0"/>
+              </a:endParaRPr>
             </a:p>
           </p:txBody>
         </p:sp>
-        <p:pic>
-          <p:nvPicPr>
-            <p:cNvPr id="5" name="Graphique 4" descr="Index pointant vers la droite vu du côté du dos de la main">
+        <p:sp>
+          <p:nvSpPr>
+            <p:cNvPr id="15" name="ZoneTexte 14">
               <a:extLst>
                 <a:ext uri="{FF2B5EF4-FFF2-40B4-BE49-F238E27FC236}">
-                  <a16:creationId xmlns:a16="http://schemas.microsoft.com/office/drawing/2014/main" id="{18909D4F-505E-43AB-8F60-5B7D24AFE5F8}"/>
+                  <a16:creationId xmlns:a16="http://schemas.microsoft.com/office/drawing/2014/main" id="{659C53BD-C4D3-4CF5-9B6D-99C19BFE5FC6}"/>
                 </a:ext>
               </a:extLst>
             </p:cNvPr>
-            <p:cNvPicPr>
-              <a:picLocks noChangeAspect="1"/>
-            </p:cNvPicPr>
+            <p:cNvSpPr txBox="1"/>
             <p:nvPr/>
-          </p:nvPicPr>
-          <p:blipFill>
-            <a:blip r:embed="rId2">
-              <a:extLst>
-                <a:ext uri="{28A0092B-C50C-407E-A947-70E740481C1C}">
-                  <a14:useLocalDpi xmlns:a14="http://schemas.microsoft.com/office/drawing/2010/main" val="0"/>
-                </a:ext>
-                <a:ext uri="{96DAC541-7B7A-43D3-8B79-37D633B846F1}">
-                  <asvg:svgBlip xmlns:asvg="http://schemas.microsoft.com/office/drawing/2016/SVG/main" r:embed="rId3"/>
-                </a:ext>
-              </a:extLst>
-            </a:blip>
-            <a:stretch>
-              <a:fillRect/>
-            </a:stretch>
-          </p:blipFill>
+          </p:nvSpPr>
           <p:spPr>
-            <a:xfrm rot="12948708">
-              <a:off x="5299742" y="2703182"/>
-              <a:ext cx="1104052" cy="1104052"/>
+            <a:xfrm>
+              <a:off x="6111312" y="2196990"/>
+              <a:ext cx="461986" cy="461665"/>
             </a:xfrm>
             <a:prstGeom prst="rect">
               <a:avLst/>
             </a:prstGeom>
+            <a:noFill/>
           </p:spPr>
-        </p:pic>
+          <p:txBody>
+            <a:bodyPr wrap="none" rtlCol="0">
+              <a:spAutoFit/>
+            </a:bodyPr>
+            <a:lstStyle/>
+            <a:p>
+              <a:r>
+                <a:rPr lang="fr-BE" sz="1600" dirty="0">
+                  <a:solidFill>
+                    <a:schemeClr val="bg1"/>
+                  </a:solidFill>
+                  <a:latin typeface="Bauhaus 93" panose="04030905020B02020C02" pitchFamily="82" charset="0"/>
+                </a:rPr>
+                <a:t>X</a:t>
+              </a:r>
+              <a:r>
+                <a:rPr lang="fr-BE" sz="2400" dirty="0">
+                  <a:solidFill>
+                    <a:schemeClr val="bg1"/>
+                  </a:solidFill>
+                  <a:latin typeface="Bauhaus 93" panose="04030905020B02020C02" pitchFamily="82" charset="0"/>
+                </a:rPr>
+                <a:t>1</a:t>
+              </a:r>
+            </a:p>
+          </p:txBody>
+        </p:sp>
       </p:grpSp>
     </p:spTree>
     <p:extLst>
@@ -3488,12 +3563,1145 @@
           <a:chExt cx="0" cy="0"/>
         </a:xfrm>
       </p:grpSpPr>
+      <p:sp>
+        <p:nvSpPr>
+          <p:cNvPr id="2" name="Rectangle 1">
+            <a:extLst>
+              <a:ext uri="{FF2B5EF4-FFF2-40B4-BE49-F238E27FC236}">
+                <a16:creationId xmlns:a16="http://schemas.microsoft.com/office/drawing/2014/main" id="{E284189C-C07B-45D3-BC9B-745661C5E876}"/>
+              </a:ext>
+            </a:extLst>
+          </p:cNvPr>
+          <p:cNvSpPr/>
+          <p:nvPr/>
+        </p:nvSpPr>
+        <p:spPr>
+          <a:xfrm>
+            <a:off x="5068137" y="2033470"/>
+            <a:ext cx="2520000" cy="2520000"/>
+          </a:xfrm>
+          <a:prstGeom prst="rect">
+            <a:avLst/>
+          </a:prstGeom>
+          <a:solidFill>
+            <a:schemeClr val="bg1"/>
+          </a:solidFill>
+          <a:ln>
+            <a:noFill/>
+          </a:ln>
+        </p:spPr>
+        <p:style>
+          <a:lnRef idx="2">
+            <a:schemeClr val="accent1">
+              <a:shade val="50000"/>
+            </a:schemeClr>
+          </a:lnRef>
+          <a:fillRef idx="1">
+            <a:schemeClr val="accent1"/>
+          </a:fillRef>
+          <a:effectRef idx="0">
+            <a:schemeClr val="accent1"/>
+          </a:effectRef>
+          <a:fontRef idx="minor">
+            <a:schemeClr val="lt1"/>
+          </a:fontRef>
+        </p:style>
+        <p:txBody>
+          <a:bodyPr rtlCol="0" anchor="ctr"/>
+          <a:lstStyle/>
+          <a:p>
+            <a:pPr algn="ctr"/>
+            <a:endParaRPr lang="fr-BE" dirty="0"/>
+          </a:p>
+        </p:txBody>
+      </p:sp>
+      <p:grpSp>
+        <p:nvGrpSpPr>
+          <p:cNvPr id="8" name="Groupe 7">
+            <a:extLst>
+              <a:ext uri="{FF2B5EF4-FFF2-40B4-BE49-F238E27FC236}">
+                <a16:creationId xmlns:a16="http://schemas.microsoft.com/office/drawing/2014/main" id="{A82639EA-0C61-4A15-8DE2-2CFB1AFF2D4D}"/>
+              </a:ext>
+            </a:extLst>
+          </p:cNvPr>
+          <p:cNvGrpSpPr/>
+          <p:nvPr/>
+        </p:nvGrpSpPr>
+        <p:grpSpPr>
+          <a:xfrm>
+            <a:off x="6238240" y="2864104"/>
+            <a:ext cx="1244362" cy="1500048"/>
+            <a:chOff x="5455209" y="2270746"/>
+            <a:chExt cx="1497368" cy="2045444"/>
+          </a:xfrm>
+        </p:grpSpPr>
+        <p:sp>
+          <p:nvSpPr>
+            <p:cNvPr id="6" name="Flèche : double flèche horizontale 5">
+              <a:extLst>
+                <a:ext uri="{FF2B5EF4-FFF2-40B4-BE49-F238E27FC236}">
+                  <a16:creationId xmlns:a16="http://schemas.microsoft.com/office/drawing/2014/main" id="{7611D091-F330-4564-A00D-463A3FBB5A3B}"/>
+                </a:ext>
+              </a:extLst>
+            </p:cNvPr>
+            <p:cNvSpPr/>
+            <p:nvPr/>
+          </p:nvSpPr>
+          <p:spPr>
+            <a:xfrm rot="16200000">
+              <a:off x="5305415" y="3142688"/>
+              <a:ext cx="2045444" cy="301560"/>
+            </a:xfrm>
+            <a:prstGeom prst="leftRightArrow">
+              <a:avLst>
+                <a:gd name="adj1" fmla="val 26141"/>
+                <a:gd name="adj2" fmla="val 58639"/>
+              </a:avLst>
+            </a:prstGeom>
+            <a:solidFill>
+              <a:schemeClr val="tx1">
+                <a:lumMod val="75000"/>
+                <a:lumOff val="25000"/>
+              </a:schemeClr>
+            </a:solidFill>
+            <a:ln>
+              <a:noFill/>
+            </a:ln>
+          </p:spPr>
+          <p:style>
+            <a:lnRef idx="2">
+              <a:schemeClr val="accent1">
+                <a:shade val="50000"/>
+              </a:schemeClr>
+            </a:lnRef>
+            <a:fillRef idx="1">
+              <a:schemeClr val="accent1"/>
+            </a:fillRef>
+            <a:effectRef idx="0">
+              <a:schemeClr val="accent1"/>
+            </a:effectRef>
+            <a:fontRef idx="minor">
+              <a:schemeClr val="lt1"/>
+            </a:fontRef>
+          </p:style>
+          <p:txBody>
+            <a:bodyPr rtlCol="0" anchor="ctr"/>
+            <a:lstStyle/>
+            <a:p>
+              <a:pPr algn="ctr"/>
+              <a:endParaRPr lang="fr-BE" dirty="0"/>
+            </a:p>
+          </p:txBody>
+        </p:sp>
+        <p:pic>
+          <p:nvPicPr>
+            <p:cNvPr id="4" name="Graphique 3" descr="Main">
+              <a:extLst>
+                <a:ext uri="{FF2B5EF4-FFF2-40B4-BE49-F238E27FC236}">
+                  <a16:creationId xmlns:a16="http://schemas.microsoft.com/office/drawing/2014/main" id="{9B7328DE-DDD4-4875-9DE0-D805A173A681}"/>
+                </a:ext>
+              </a:extLst>
+            </p:cNvPr>
+            <p:cNvPicPr>
+              <a:picLocks noChangeAspect="1"/>
+            </p:cNvPicPr>
+            <p:nvPr/>
+          </p:nvPicPr>
+          <p:blipFill>
+            <a:blip r:embed="rId2">
+              <a:extLst>
+                <a:ext uri="{28A0092B-C50C-407E-A947-70E740481C1C}">
+                  <a14:useLocalDpi xmlns:a14="http://schemas.microsoft.com/office/drawing/2010/main" val="0"/>
+                </a:ext>
+                <a:ext uri="{96DAC541-7B7A-43D3-8B79-37D633B846F1}">
+                  <asvg:svgBlip xmlns:asvg="http://schemas.microsoft.com/office/drawing/2016/SVG/main" r:embed="rId3"/>
+                </a:ext>
+              </a:extLst>
+            </a:blip>
+            <a:stretch>
+              <a:fillRect/>
+            </a:stretch>
+          </p:blipFill>
+          <p:spPr>
+            <a:xfrm rot="18000000">
+              <a:off x="5455209" y="2544784"/>
+              <a:ext cx="1497368" cy="1497368"/>
+            </a:xfrm>
+            <a:prstGeom prst="rect">
+              <a:avLst/>
+            </a:prstGeom>
+          </p:spPr>
+        </p:pic>
+      </p:grpSp>
+      <p:grpSp>
+        <p:nvGrpSpPr>
+          <p:cNvPr id="9" name="Groupe 8">
+            <a:extLst>
+              <a:ext uri="{FF2B5EF4-FFF2-40B4-BE49-F238E27FC236}">
+                <a16:creationId xmlns:a16="http://schemas.microsoft.com/office/drawing/2014/main" id="{BD9BE7C1-774B-4C5C-8A66-834232C57690}"/>
+              </a:ext>
+            </a:extLst>
+          </p:cNvPr>
+          <p:cNvGrpSpPr/>
+          <p:nvPr/>
+        </p:nvGrpSpPr>
+        <p:grpSpPr>
+          <a:xfrm flipH="1">
+            <a:off x="5197119" y="2864103"/>
+            <a:ext cx="1245600" cy="1501200"/>
+            <a:chOff x="5455209" y="2270746"/>
+            <a:chExt cx="1497368" cy="2045444"/>
+          </a:xfrm>
+        </p:grpSpPr>
+        <p:sp>
+          <p:nvSpPr>
+            <p:cNvPr id="10" name="Flèche : double flèche horizontale 9">
+              <a:extLst>
+                <a:ext uri="{FF2B5EF4-FFF2-40B4-BE49-F238E27FC236}">
+                  <a16:creationId xmlns:a16="http://schemas.microsoft.com/office/drawing/2014/main" id="{3EED21E6-869E-4F49-A2CE-B3C176E7D4DB}"/>
+                </a:ext>
+              </a:extLst>
+            </p:cNvPr>
+            <p:cNvSpPr/>
+            <p:nvPr/>
+          </p:nvSpPr>
+          <p:spPr>
+            <a:xfrm rot="16200000">
+              <a:off x="5305415" y="3142688"/>
+              <a:ext cx="2045444" cy="301560"/>
+            </a:xfrm>
+            <a:prstGeom prst="leftRightArrow">
+              <a:avLst>
+                <a:gd name="adj1" fmla="val 26141"/>
+                <a:gd name="adj2" fmla="val 58639"/>
+              </a:avLst>
+            </a:prstGeom>
+            <a:solidFill>
+              <a:schemeClr val="tx1">
+                <a:lumMod val="75000"/>
+                <a:lumOff val="25000"/>
+              </a:schemeClr>
+            </a:solidFill>
+            <a:ln>
+              <a:noFill/>
+            </a:ln>
+          </p:spPr>
+          <p:style>
+            <a:lnRef idx="2">
+              <a:schemeClr val="accent1">
+                <a:shade val="50000"/>
+              </a:schemeClr>
+            </a:lnRef>
+            <a:fillRef idx="1">
+              <a:schemeClr val="accent1"/>
+            </a:fillRef>
+            <a:effectRef idx="0">
+              <a:schemeClr val="accent1"/>
+            </a:effectRef>
+            <a:fontRef idx="minor">
+              <a:schemeClr val="lt1"/>
+            </a:fontRef>
+          </p:style>
+          <p:txBody>
+            <a:bodyPr rtlCol="0" anchor="ctr"/>
+            <a:lstStyle/>
+            <a:p>
+              <a:pPr algn="ctr"/>
+              <a:endParaRPr lang="fr-BE" dirty="0"/>
+            </a:p>
+          </p:txBody>
+        </p:sp>
+        <p:pic>
+          <p:nvPicPr>
+            <p:cNvPr id="11" name="Graphique 10" descr="Main">
+              <a:extLst>
+                <a:ext uri="{FF2B5EF4-FFF2-40B4-BE49-F238E27FC236}">
+                  <a16:creationId xmlns:a16="http://schemas.microsoft.com/office/drawing/2014/main" id="{5E3ED067-C7BB-4D1C-8E12-4F5E38909B85}"/>
+                </a:ext>
+              </a:extLst>
+            </p:cNvPr>
+            <p:cNvPicPr>
+              <a:picLocks noChangeAspect="1"/>
+            </p:cNvPicPr>
+            <p:nvPr/>
+          </p:nvPicPr>
+          <p:blipFill>
+            <a:blip r:embed="rId2">
+              <a:extLst>
+                <a:ext uri="{28A0092B-C50C-407E-A947-70E740481C1C}">
+                  <a14:useLocalDpi xmlns:a14="http://schemas.microsoft.com/office/drawing/2010/main" val="0"/>
+                </a:ext>
+                <a:ext uri="{96DAC541-7B7A-43D3-8B79-37D633B846F1}">
+                  <asvg:svgBlip xmlns:asvg="http://schemas.microsoft.com/office/drawing/2016/SVG/main" r:embed="rId3"/>
+                </a:ext>
+              </a:extLst>
+            </a:blip>
+            <a:stretch>
+              <a:fillRect/>
+            </a:stretch>
+          </p:blipFill>
+          <p:spPr>
+            <a:xfrm rot="18000000">
+              <a:off x="5455209" y="2544784"/>
+              <a:ext cx="1497368" cy="1497368"/>
+            </a:xfrm>
+            <a:prstGeom prst="rect">
+              <a:avLst/>
+            </a:prstGeom>
+          </p:spPr>
+        </p:pic>
+      </p:grpSp>
+      <p:grpSp>
+        <p:nvGrpSpPr>
+          <p:cNvPr id="16" name="Groupe 15">
+            <a:extLst>
+              <a:ext uri="{FF2B5EF4-FFF2-40B4-BE49-F238E27FC236}">
+                <a16:creationId xmlns:a16="http://schemas.microsoft.com/office/drawing/2014/main" id="{CDADB451-CA6F-4425-94AC-CD0C5EFA27E6}"/>
+              </a:ext>
+            </a:extLst>
+          </p:cNvPr>
+          <p:cNvGrpSpPr/>
+          <p:nvPr/>
+        </p:nvGrpSpPr>
+        <p:grpSpPr>
+          <a:xfrm>
+            <a:off x="6111312" y="2196990"/>
+            <a:ext cx="461986" cy="461665"/>
+            <a:chOff x="6111312" y="2196990"/>
+            <a:chExt cx="461986" cy="461665"/>
+          </a:xfrm>
+        </p:grpSpPr>
+        <p:sp>
+          <p:nvSpPr>
+            <p:cNvPr id="12" name="Ellipse 11">
+              <a:extLst>
+                <a:ext uri="{FF2B5EF4-FFF2-40B4-BE49-F238E27FC236}">
+                  <a16:creationId xmlns:a16="http://schemas.microsoft.com/office/drawing/2014/main" id="{38602DEB-B063-4A6F-933F-83DA891DF812}"/>
+                </a:ext>
+              </a:extLst>
+            </p:cNvPr>
+            <p:cNvSpPr/>
+            <p:nvPr/>
+          </p:nvSpPr>
+          <p:spPr>
+            <a:xfrm>
+              <a:off x="6120765" y="2228775"/>
+              <a:ext cx="414744" cy="414744"/>
+            </a:xfrm>
+            <a:prstGeom prst="ellipse">
+              <a:avLst/>
+            </a:prstGeom>
+            <a:solidFill>
+              <a:schemeClr val="tx1">
+                <a:lumMod val="75000"/>
+                <a:lumOff val="25000"/>
+              </a:schemeClr>
+            </a:solidFill>
+            <a:ln>
+              <a:noFill/>
+            </a:ln>
+          </p:spPr>
+          <p:style>
+            <a:lnRef idx="2">
+              <a:schemeClr val="accent1">
+                <a:shade val="50000"/>
+              </a:schemeClr>
+            </a:lnRef>
+            <a:fillRef idx="1">
+              <a:schemeClr val="accent1"/>
+            </a:fillRef>
+            <a:effectRef idx="0">
+              <a:schemeClr val="accent1"/>
+            </a:effectRef>
+            <a:fontRef idx="minor">
+              <a:schemeClr val="lt1"/>
+            </a:fontRef>
+          </p:style>
+          <p:txBody>
+            <a:bodyPr rtlCol="0" anchor="ctr"/>
+            <a:lstStyle/>
+            <a:p>
+              <a:pPr algn="ctr"/>
+              <a:endParaRPr lang="fr-BE" sz="600" dirty="0">
+                <a:latin typeface="Bauhaus 93" panose="04030905020B02020C02" pitchFamily="82" charset="0"/>
+              </a:endParaRPr>
+            </a:p>
+          </p:txBody>
+        </p:sp>
+        <p:sp>
+          <p:nvSpPr>
+            <p:cNvPr id="15" name="ZoneTexte 14">
+              <a:extLst>
+                <a:ext uri="{FF2B5EF4-FFF2-40B4-BE49-F238E27FC236}">
+                  <a16:creationId xmlns:a16="http://schemas.microsoft.com/office/drawing/2014/main" id="{659C53BD-C4D3-4CF5-9B6D-99C19BFE5FC6}"/>
+                </a:ext>
+              </a:extLst>
+            </p:cNvPr>
+            <p:cNvSpPr txBox="1"/>
+            <p:nvPr/>
+          </p:nvSpPr>
+          <p:spPr>
+            <a:xfrm>
+              <a:off x="6111312" y="2196990"/>
+              <a:ext cx="461986" cy="461665"/>
+            </a:xfrm>
+            <a:prstGeom prst="rect">
+              <a:avLst/>
+            </a:prstGeom>
+            <a:noFill/>
+          </p:spPr>
+          <p:txBody>
+            <a:bodyPr wrap="none" rtlCol="0">
+              <a:spAutoFit/>
+            </a:bodyPr>
+            <a:lstStyle/>
+            <a:p>
+              <a:r>
+                <a:rPr lang="fr-BE" sz="1600" dirty="0">
+                  <a:solidFill>
+                    <a:schemeClr val="bg1"/>
+                  </a:solidFill>
+                  <a:latin typeface="Bauhaus 93" panose="04030905020B02020C02" pitchFamily="82" charset="0"/>
+                </a:rPr>
+                <a:t>X</a:t>
+              </a:r>
+              <a:r>
+                <a:rPr lang="fr-BE" sz="2400" dirty="0">
+                  <a:solidFill>
+                    <a:schemeClr val="bg1"/>
+                  </a:solidFill>
+                  <a:latin typeface="Bauhaus 93" panose="04030905020B02020C02" pitchFamily="82" charset="0"/>
+                </a:rPr>
+                <a:t>3</a:t>
+              </a:r>
+            </a:p>
+          </p:txBody>
+        </p:sp>
+      </p:grpSp>
+    </p:spTree>
+    <p:extLst>
+      <p:ext uri="{BB962C8B-B14F-4D97-AF65-F5344CB8AC3E}">
+        <p14:creationId xmlns:p14="http://schemas.microsoft.com/office/powerpoint/2010/main" val="4199258400"/>
+      </p:ext>
+    </p:extLst>
+  </p:cSld>
+  <p:clrMapOvr>
+    <a:masterClrMapping/>
+  </p:clrMapOvr>
+</p:sld>
+</file>
+
+<file path=ppt/slides/slide3.xml><?xml version="1.0" encoding="utf-8"?>
+<p:sld xmlns:a="http://schemas.openxmlformats.org/drawingml/2006/main" xmlns:r="http://schemas.openxmlformats.org/officeDocument/2006/relationships" xmlns:p="http://schemas.openxmlformats.org/presentationml/2006/main">
+  <p:cSld>
+    <p:spTree>
+      <p:nvGrpSpPr>
+        <p:cNvPr id="1" name=""/>
+        <p:cNvGrpSpPr/>
+        <p:nvPr/>
+      </p:nvGrpSpPr>
+      <p:grpSpPr>
+        <a:xfrm>
+          <a:off x="0" y="0"/>
+          <a:ext cx="0" cy="0"/>
+          <a:chOff x="0" y="0"/>
+          <a:chExt cx="0" cy="0"/>
+        </a:xfrm>
+      </p:grpSpPr>
+      <p:sp>
+        <p:nvSpPr>
+          <p:cNvPr id="2" name="Rectangle 1">
+            <a:extLst>
+              <a:ext uri="{FF2B5EF4-FFF2-40B4-BE49-F238E27FC236}">
+                <a16:creationId xmlns:a16="http://schemas.microsoft.com/office/drawing/2014/main" id="{E284189C-C07B-45D3-BC9B-745661C5E876}"/>
+              </a:ext>
+            </a:extLst>
+          </p:cNvPr>
+          <p:cNvSpPr/>
+          <p:nvPr/>
+        </p:nvSpPr>
+        <p:spPr>
+          <a:xfrm>
+            <a:off x="5068137" y="2033470"/>
+            <a:ext cx="2520000" cy="2520000"/>
+          </a:xfrm>
+          <a:prstGeom prst="rect">
+            <a:avLst/>
+          </a:prstGeom>
+          <a:solidFill>
+            <a:schemeClr val="bg1"/>
+          </a:solidFill>
+          <a:ln>
+            <a:noFill/>
+          </a:ln>
+        </p:spPr>
+        <p:style>
+          <a:lnRef idx="2">
+            <a:schemeClr val="accent1">
+              <a:shade val="50000"/>
+            </a:schemeClr>
+          </a:lnRef>
+          <a:fillRef idx="1">
+            <a:schemeClr val="accent1"/>
+          </a:fillRef>
+          <a:effectRef idx="0">
+            <a:schemeClr val="accent1"/>
+          </a:effectRef>
+          <a:fontRef idx="minor">
+            <a:schemeClr val="lt1"/>
+          </a:fontRef>
+        </p:style>
+        <p:txBody>
+          <a:bodyPr rtlCol="0" anchor="ctr"/>
+          <a:lstStyle/>
+          <a:p>
+            <a:pPr algn="ctr"/>
+            <a:endParaRPr lang="fr-BE" dirty="0"/>
+          </a:p>
+        </p:txBody>
+      </p:sp>
+      <p:grpSp>
+        <p:nvGrpSpPr>
+          <p:cNvPr id="23" name="Groupe 22">
+            <a:extLst>
+              <a:ext uri="{FF2B5EF4-FFF2-40B4-BE49-F238E27FC236}">
+                <a16:creationId xmlns:a16="http://schemas.microsoft.com/office/drawing/2014/main" id="{75C677B3-12F4-40FA-94D7-B4AE4BFE2A91}"/>
+              </a:ext>
+            </a:extLst>
+          </p:cNvPr>
+          <p:cNvGrpSpPr/>
+          <p:nvPr/>
+        </p:nvGrpSpPr>
+        <p:grpSpPr>
+          <a:xfrm>
+            <a:off x="5943600" y="2197093"/>
+            <a:ext cx="1273809" cy="461665"/>
+            <a:chOff x="5969000" y="1535346"/>
+            <a:chExt cx="1273809" cy="461665"/>
+          </a:xfrm>
+        </p:grpSpPr>
+        <p:sp>
+          <p:nvSpPr>
+            <p:cNvPr id="7" name="Forme libre : forme 6">
+              <a:extLst>
+                <a:ext uri="{FF2B5EF4-FFF2-40B4-BE49-F238E27FC236}">
+                  <a16:creationId xmlns:a16="http://schemas.microsoft.com/office/drawing/2014/main" id="{390A6F54-CB9E-423D-B563-11394E285DC7}"/>
+                </a:ext>
+              </a:extLst>
+            </p:cNvPr>
+            <p:cNvSpPr/>
+            <p:nvPr/>
+          </p:nvSpPr>
+          <p:spPr>
+            <a:xfrm>
+              <a:off x="6185896" y="1567028"/>
+              <a:ext cx="1056913" cy="414744"/>
+            </a:xfrm>
+            <a:custGeom>
+              <a:avLst/>
+              <a:gdLst>
+                <a:gd name="connsiteX0" fmla="*/ 0 w 880110"/>
+                <a:gd name="connsiteY0" fmla="*/ 0 h 413385"/>
+                <a:gd name="connsiteX1" fmla="*/ 0 w 880110"/>
+                <a:gd name="connsiteY1" fmla="*/ 0 h 413385"/>
+                <a:gd name="connsiteX2" fmla="*/ 510540 w 880110"/>
+                <a:gd name="connsiteY2" fmla="*/ 59055 h 413385"/>
+                <a:gd name="connsiteX3" fmla="*/ 127635 w 880110"/>
+                <a:gd name="connsiteY3" fmla="*/ 72390 h 413385"/>
+                <a:gd name="connsiteX4" fmla="*/ 691515 w 880110"/>
+                <a:gd name="connsiteY4" fmla="*/ 110490 h 413385"/>
+                <a:gd name="connsiteX5" fmla="*/ 144780 w 880110"/>
+                <a:gd name="connsiteY5" fmla="*/ 144780 h 413385"/>
+                <a:gd name="connsiteX6" fmla="*/ 880110 w 880110"/>
+                <a:gd name="connsiteY6" fmla="*/ 161925 h 413385"/>
+                <a:gd name="connsiteX7" fmla="*/ 120015 w 880110"/>
+                <a:gd name="connsiteY7" fmla="*/ 228600 h 413385"/>
+                <a:gd name="connsiteX8" fmla="*/ 771525 w 880110"/>
+                <a:gd name="connsiteY8" fmla="*/ 226695 h 413385"/>
+                <a:gd name="connsiteX9" fmla="*/ 102870 w 880110"/>
+                <a:gd name="connsiteY9" fmla="*/ 302895 h 413385"/>
+                <a:gd name="connsiteX10" fmla="*/ 563880 w 880110"/>
+                <a:gd name="connsiteY10" fmla="*/ 299085 h 413385"/>
+                <a:gd name="connsiteX11" fmla="*/ 7620 w 880110"/>
+                <a:gd name="connsiteY11" fmla="*/ 413385 h 413385"/>
+                <a:gd name="connsiteX12" fmla="*/ 0 w 880110"/>
+                <a:gd name="connsiteY12" fmla="*/ 0 h 413385"/>
+              </a:gdLst>
+              <a:ahLst/>
+              <a:cxnLst>
+                <a:cxn ang="0">
+                  <a:pos x="connsiteX0" y="connsiteY0"/>
+                </a:cxn>
+                <a:cxn ang="0">
+                  <a:pos x="connsiteX1" y="connsiteY1"/>
+                </a:cxn>
+                <a:cxn ang="0">
+                  <a:pos x="connsiteX2" y="connsiteY2"/>
+                </a:cxn>
+                <a:cxn ang="0">
+                  <a:pos x="connsiteX3" y="connsiteY3"/>
+                </a:cxn>
+                <a:cxn ang="0">
+                  <a:pos x="connsiteX4" y="connsiteY4"/>
+                </a:cxn>
+                <a:cxn ang="0">
+                  <a:pos x="connsiteX5" y="connsiteY5"/>
+                </a:cxn>
+                <a:cxn ang="0">
+                  <a:pos x="connsiteX6" y="connsiteY6"/>
+                </a:cxn>
+                <a:cxn ang="0">
+                  <a:pos x="connsiteX7" y="connsiteY7"/>
+                </a:cxn>
+                <a:cxn ang="0">
+                  <a:pos x="connsiteX8" y="connsiteY8"/>
+                </a:cxn>
+                <a:cxn ang="0">
+                  <a:pos x="connsiteX9" y="connsiteY9"/>
+                </a:cxn>
+                <a:cxn ang="0">
+                  <a:pos x="connsiteX10" y="connsiteY10"/>
+                </a:cxn>
+                <a:cxn ang="0">
+                  <a:pos x="connsiteX11" y="connsiteY11"/>
+                </a:cxn>
+                <a:cxn ang="0">
+                  <a:pos x="connsiteX12" y="connsiteY12"/>
+                </a:cxn>
+              </a:cxnLst>
+              <a:rect l="l" t="t" r="r" b="b"/>
+              <a:pathLst>
+                <a:path w="880110" h="413385">
+                  <a:moveTo>
+                    <a:pt x="0" y="0"/>
+                  </a:moveTo>
+                  <a:lnTo>
+                    <a:pt x="0" y="0"/>
+                  </a:lnTo>
+                  <a:lnTo>
+                    <a:pt x="510540" y="59055"/>
+                  </a:lnTo>
+                  <a:lnTo>
+                    <a:pt x="127635" y="72390"/>
+                  </a:lnTo>
+                  <a:lnTo>
+                    <a:pt x="691515" y="110490"/>
+                  </a:lnTo>
+                  <a:lnTo>
+                    <a:pt x="144780" y="144780"/>
+                  </a:lnTo>
+                  <a:lnTo>
+                    <a:pt x="880110" y="161925"/>
+                  </a:lnTo>
+                  <a:lnTo>
+                    <a:pt x="120015" y="228600"/>
+                  </a:lnTo>
+                  <a:lnTo>
+                    <a:pt x="771525" y="226695"/>
+                  </a:lnTo>
+                  <a:lnTo>
+                    <a:pt x="102870" y="302895"/>
+                  </a:lnTo>
+                  <a:lnTo>
+                    <a:pt x="563880" y="299085"/>
+                  </a:lnTo>
+                  <a:lnTo>
+                    <a:pt x="7620" y="413385"/>
+                  </a:lnTo>
+                  <a:lnTo>
+                    <a:pt x="0" y="0"/>
+                  </a:lnTo>
+                  <a:close/>
+                </a:path>
+              </a:pathLst>
+            </a:custGeom>
+            <a:solidFill>
+              <a:schemeClr val="tx1">
+                <a:lumMod val="75000"/>
+                <a:lumOff val="25000"/>
+              </a:schemeClr>
+            </a:solidFill>
+            <a:ln>
+              <a:noFill/>
+            </a:ln>
+          </p:spPr>
+          <p:style>
+            <a:lnRef idx="2">
+              <a:schemeClr val="accent1">
+                <a:shade val="50000"/>
+              </a:schemeClr>
+            </a:lnRef>
+            <a:fillRef idx="1">
+              <a:schemeClr val="accent1"/>
+            </a:fillRef>
+            <a:effectRef idx="0">
+              <a:schemeClr val="accent1"/>
+            </a:effectRef>
+            <a:fontRef idx="minor">
+              <a:schemeClr val="lt1"/>
+            </a:fontRef>
+          </p:style>
+          <p:txBody>
+            <a:bodyPr rtlCol="0" anchor="ctr"/>
+            <a:lstStyle/>
+            <a:p>
+              <a:pPr algn="ctr"/>
+              <a:endParaRPr lang="fr-BE"/>
+            </a:p>
+          </p:txBody>
+        </p:sp>
+        <p:grpSp>
+          <p:nvGrpSpPr>
+            <p:cNvPr id="22" name="Groupe 21">
+              <a:extLst>
+                <a:ext uri="{FF2B5EF4-FFF2-40B4-BE49-F238E27FC236}">
+                  <a16:creationId xmlns:a16="http://schemas.microsoft.com/office/drawing/2014/main" id="{76143ABA-7561-4997-9D58-2047E2A290AD}"/>
+                </a:ext>
+              </a:extLst>
+            </p:cNvPr>
+            <p:cNvGrpSpPr/>
+            <p:nvPr/>
+          </p:nvGrpSpPr>
+          <p:grpSpPr>
+            <a:xfrm>
+              <a:off x="5969000" y="1535346"/>
+              <a:ext cx="461986" cy="461665"/>
+              <a:chOff x="5969000" y="1535346"/>
+              <a:chExt cx="461986" cy="461665"/>
+            </a:xfrm>
+          </p:grpSpPr>
+          <p:sp>
+            <p:nvSpPr>
+              <p:cNvPr id="12" name="Ellipse 11">
+                <a:extLst>
+                  <a:ext uri="{FF2B5EF4-FFF2-40B4-BE49-F238E27FC236}">
+                    <a16:creationId xmlns:a16="http://schemas.microsoft.com/office/drawing/2014/main" id="{38602DEB-B063-4A6F-933F-83DA891DF812}"/>
+                  </a:ext>
+                </a:extLst>
+              </p:cNvPr>
+              <p:cNvSpPr/>
+              <p:nvPr/>
+            </p:nvSpPr>
+            <p:spPr>
+              <a:xfrm>
+                <a:off x="5978525" y="1567027"/>
+                <a:ext cx="414744" cy="414744"/>
+              </a:xfrm>
+              <a:prstGeom prst="ellipse">
+                <a:avLst/>
+              </a:prstGeom>
+              <a:solidFill>
+                <a:schemeClr val="tx1">
+                  <a:lumMod val="75000"/>
+                  <a:lumOff val="25000"/>
+                </a:schemeClr>
+              </a:solidFill>
+              <a:ln>
+                <a:noFill/>
+              </a:ln>
+            </p:spPr>
+            <p:style>
+              <a:lnRef idx="2">
+                <a:schemeClr val="accent1">
+                  <a:shade val="50000"/>
+                </a:schemeClr>
+              </a:lnRef>
+              <a:fillRef idx="1">
+                <a:schemeClr val="accent1"/>
+              </a:fillRef>
+              <a:effectRef idx="0">
+                <a:schemeClr val="accent1"/>
+              </a:effectRef>
+              <a:fontRef idx="minor">
+                <a:schemeClr val="lt1"/>
+              </a:fontRef>
+            </p:style>
+            <p:txBody>
+              <a:bodyPr rtlCol="0" anchor="ctr"/>
+              <a:lstStyle/>
+              <a:p>
+                <a:pPr algn="ctr"/>
+                <a:endParaRPr lang="fr-BE" sz="600" dirty="0">
+                  <a:latin typeface="Bauhaus 93" panose="04030905020B02020C02" pitchFamily="82" charset="0"/>
+                </a:endParaRPr>
+              </a:p>
+            </p:txBody>
+          </p:sp>
+          <p:sp>
+            <p:nvSpPr>
+              <p:cNvPr id="15" name="ZoneTexte 14">
+                <a:extLst>
+                  <a:ext uri="{FF2B5EF4-FFF2-40B4-BE49-F238E27FC236}">
+                    <a16:creationId xmlns:a16="http://schemas.microsoft.com/office/drawing/2014/main" id="{659C53BD-C4D3-4CF5-9B6D-99C19BFE5FC6}"/>
+                  </a:ext>
+                </a:extLst>
+              </p:cNvPr>
+              <p:cNvSpPr txBox="1"/>
+              <p:nvPr/>
+            </p:nvSpPr>
+            <p:spPr>
+              <a:xfrm>
+                <a:off x="5969000" y="1535346"/>
+                <a:ext cx="461986" cy="461665"/>
+              </a:xfrm>
+              <a:prstGeom prst="rect">
+                <a:avLst/>
+              </a:prstGeom>
+              <a:noFill/>
+            </p:spPr>
+            <p:txBody>
+              <a:bodyPr wrap="none" rtlCol="0">
+                <a:spAutoFit/>
+              </a:bodyPr>
+              <a:lstStyle/>
+              <a:p>
+                <a:r>
+                  <a:rPr lang="fr-BE" sz="1600" dirty="0">
+                    <a:solidFill>
+                      <a:schemeClr val="bg1"/>
+                    </a:solidFill>
+                    <a:latin typeface="Bauhaus 93" panose="04030905020B02020C02" pitchFamily="82" charset="0"/>
+                  </a:rPr>
+                  <a:t>X</a:t>
+                </a:r>
+                <a:r>
+                  <a:rPr lang="fr-BE" sz="2400" dirty="0">
+                    <a:solidFill>
+                      <a:schemeClr val="bg1"/>
+                    </a:solidFill>
+                    <a:latin typeface="Bauhaus 93" panose="04030905020B02020C02" pitchFamily="82" charset="0"/>
+                  </a:rPr>
+                  <a:t>3</a:t>
+                </a:r>
+              </a:p>
+            </p:txBody>
+          </p:sp>
+        </p:grpSp>
+      </p:grpSp>
+      <p:grpSp>
+        <p:nvGrpSpPr>
+          <p:cNvPr id="14" name="Groupe 13">
+            <a:extLst>
+              <a:ext uri="{FF2B5EF4-FFF2-40B4-BE49-F238E27FC236}">
+                <a16:creationId xmlns:a16="http://schemas.microsoft.com/office/drawing/2014/main" id="{E38A2694-E061-4D68-8FCE-C04138F76931}"/>
+              </a:ext>
+            </a:extLst>
+          </p:cNvPr>
+          <p:cNvGrpSpPr/>
+          <p:nvPr/>
+        </p:nvGrpSpPr>
+        <p:grpSpPr>
+          <a:xfrm>
+            <a:off x="6238240" y="2864104"/>
+            <a:ext cx="1244362" cy="1500048"/>
+            <a:chOff x="5455209" y="2270746"/>
+            <a:chExt cx="1497368" cy="2045444"/>
+          </a:xfrm>
+        </p:grpSpPr>
+        <p:sp>
+          <p:nvSpPr>
+            <p:cNvPr id="16" name="Flèche : double flèche horizontale 15">
+              <a:extLst>
+                <a:ext uri="{FF2B5EF4-FFF2-40B4-BE49-F238E27FC236}">
+                  <a16:creationId xmlns:a16="http://schemas.microsoft.com/office/drawing/2014/main" id="{4CF632A5-58D0-40C0-BA60-2722B2A5C23A}"/>
+                </a:ext>
+              </a:extLst>
+            </p:cNvPr>
+            <p:cNvSpPr/>
+            <p:nvPr/>
+          </p:nvSpPr>
+          <p:spPr>
+            <a:xfrm rot="16200000">
+              <a:off x="5305415" y="3142688"/>
+              <a:ext cx="2045444" cy="301560"/>
+            </a:xfrm>
+            <a:prstGeom prst="leftRightArrow">
+              <a:avLst>
+                <a:gd name="adj1" fmla="val 26141"/>
+                <a:gd name="adj2" fmla="val 58639"/>
+              </a:avLst>
+            </a:prstGeom>
+            <a:solidFill>
+              <a:schemeClr val="tx1">
+                <a:lumMod val="75000"/>
+                <a:lumOff val="25000"/>
+              </a:schemeClr>
+            </a:solidFill>
+            <a:ln>
+              <a:noFill/>
+            </a:ln>
+          </p:spPr>
+          <p:style>
+            <a:lnRef idx="2">
+              <a:schemeClr val="accent1">
+                <a:shade val="50000"/>
+              </a:schemeClr>
+            </a:lnRef>
+            <a:fillRef idx="1">
+              <a:schemeClr val="accent1"/>
+            </a:fillRef>
+            <a:effectRef idx="0">
+              <a:schemeClr val="accent1"/>
+            </a:effectRef>
+            <a:fontRef idx="minor">
+              <a:schemeClr val="lt1"/>
+            </a:fontRef>
+          </p:style>
+          <p:txBody>
+            <a:bodyPr rtlCol="0" anchor="ctr"/>
+            <a:lstStyle/>
+            <a:p>
+              <a:pPr algn="ctr"/>
+              <a:endParaRPr lang="fr-BE" dirty="0"/>
+            </a:p>
+          </p:txBody>
+        </p:sp>
+        <p:pic>
+          <p:nvPicPr>
+            <p:cNvPr id="17" name="Graphique 16" descr="Main">
+              <a:extLst>
+                <a:ext uri="{FF2B5EF4-FFF2-40B4-BE49-F238E27FC236}">
+                  <a16:creationId xmlns:a16="http://schemas.microsoft.com/office/drawing/2014/main" id="{50A06A24-A391-4128-A548-7ADC21F343AF}"/>
+                </a:ext>
+              </a:extLst>
+            </p:cNvPr>
+            <p:cNvPicPr>
+              <a:picLocks noChangeAspect="1"/>
+            </p:cNvPicPr>
+            <p:nvPr/>
+          </p:nvPicPr>
+          <p:blipFill>
+            <a:blip r:embed="rId2">
+              <a:extLst>
+                <a:ext uri="{28A0092B-C50C-407E-A947-70E740481C1C}">
+                  <a14:useLocalDpi xmlns:a14="http://schemas.microsoft.com/office/drawing/2010/main" val="0"/>
+                </a:ext>
+                <a:ext uri="{96DAC541-7B7A-43D3-8B79-37D633B846F1}">
+                  <asvg:svgBlip xmlns:asvg="http://schemas.microsoft.com/office/drawing/2016/SVG/main" r:embed="rId3"/>
+                </a:ext>
+              </a:extLst>
+            </a:blip>
+            <a:stretch>
+              <a:fillRect/>
+            </a:stretch>
+          </p:blipFill>
+          <p:spPr>
+            <a:xfrm rot="18000000">
+              <a:off x="5455209" y="2544784"/>
+              <a:ext cx="1497368" cy="1497368"/>
+            </a:xfrm>
+            <a:prstGeom prst="rect">
+              <a:avLst/>
+            </a:prstGeom>
+          </p:spPr>
+        </p:pic>
+      </p:grpSp>
+      <p:grpSp>
+        <p:nvGrpSpPr>
+          <p:cNvPr id="18" name="Groupe 17">
+            <a:extLst>
+              <a:ext uri="{FF2B5EF4-FFF2-40B4-BE49-F238E27FC236}">
+                <a16:creationId xmlns:a16="http://schemas.microsoft.com/office/drawing/2014/main" id="{A8408089-5F4C-4A95-979D-EDE0A71DF2E5}"/>
+              </a:ext>
+            </a:extLst>
+          </p:cNvPr>
+          <p:cNvGrpSpPr/>
+          <p:nvPr/>
+        </p:nvGrpSpPr>
+        <p:grpSpPr>
+          <a:xfrm flipH="1">
+            <a:off x="5197119" y="2864103"/>
+            <a:ext cx="1245600" cy="1501200"/>
+            <a:chOff x="5455209" y="2270746"/>
+            <a:chExt cx="1497368" cy="2045444"/>
+          </a:xfrm>
+        </p:grpSpPr>
+        <p:sp>
+          <p:nvSpPr>
+            <p:cNvPr id="19" name="Flèche : double flèche horizontale 18">
+              <a:extLst>
+                <a:ext uri="{FF2B5EF4-FFF2-40B4-BE49-F238E27FC236}">
+                  <a16:creationId xmlns:a16="http://schemas.microsoft.com/office/drawing/2014/main" id="{BA0B466A-939D-4E45-954D-94FD623A24B9}"/>
+                </a:ext>
+              </a:extLst>
+            </p:cNvPr>
+            <p:cNvSpPr/>
+            <p:nvPr/>
+          </p:nvSpPr>
+          <p:spPr>
+            <a:xfrm rot="16200000">
+              <a:off x="5305415" y="3142688"/>
+              <a:ext cx="2045444" cy="301560"/>
+            </a:xfrm>
+            <a:prstGeom prst="leftRightArrow">
+              <a:avLst>
+                <a:gd name="adj1" fmla="val 26141"/>
+                <a:gd name="adj2" fmla="val 58639"/>
+              </a:avLst>
+            </a:prstGeom>
+            <a:solidFill>
+              <a:schemeClr val="tx1">
+                <a:lumMod val="75000"/>
+                <a:lumOff val="25000"/>
+              </a:schemeClr>
+            </a:solidFill>
+            <a:ln>
+              <a:noFill/>
+            </a:ln>
+          </p:spPr>
+          <p:style>
+            <a:lnRef idx="2">
+              <a:schemeClr val="accent1">
+                <a:shade val="50000"/>
+              </a:schemeClr>
+            </a:lnRef>
+            <a:fillRef idx="1">
+              <a:schemeClr val="accent1"/>
+            </a:fillRef>
+            <a:effectRef idx="0">
+              <a:schemeClr val="accent1"/>
+            </a:effectRef>
+            <a:fontRef idx="minor">
+              <a:schemeClr val="lt1"/>
+            </a:fontRef>
+          </p:style>
+          <p:txBody>
+            <a:bodyPr rtlCol="0" anchor="ctr"/>
+            <a:lstStyle/>
+            <a:p>
+              <a:pPr algn="ctr"/>
+              <a:endParaRPr lang="fr-BE" dirty="0"/>
+            </a:p>
+          </p:txBody>
+        </p:sp>
+        <p:pic>
+          <p:nvPicPr>
+            <p:cNvPr id="20" name="Graphique 19" descr="Main">
+              <a:extLst>
+                <a:ext uri="{FF2B5EF4-FFF2-40B4-BE49-F238E27FC236}">
+                  <a16:creationId xmlns:a16="http://schemas.microsoft.com/office/drawing/2014/main" id="{9BA1EF91-EE1A-4BE6-9661-218B8E3E83C8}"/>
+                </a:ext>
+              </a:extLst>
+            </p:cNvPr>
+            <p:cNvPicPr>
+              <a:picLocks noChangeAspect="1"/>
+            </p:cNvPicPr>
+            <p:nvPr/>
+          </p:nvPicPr>
+          <p:blipFill>
+            <a:blip r:embed="rId2">
+              <a:extLst>
+                <a:ext uri="{28A0092B-C50C-407E-A947-70E740481C1C}">
+                  <a14:useLocalDpi xmlns:a14="http://schemas.microsoft.com/office/drawing/2010/main" val="0"/>
+                </a:ext>
+                <a:ext uri="{96DAC541-7B7A-43D3-8B79-37D633B846F1}">
+                  <asvg:svgBlip xmlns:asvg="http://schemas.microsoft.com/office/drawing/2016/SVG/main" r:embed="rId3"/>
+                </a:ext>
+              </a:extLst>
+            </a:blip>
+            <a:stretch>
+              <a:fillRect/>
+            </a:stretch>
+          </p:blipFill>
+          <p:spPr>
+            <a:xfrm rot="18000000">
+              <a:off x="5455209" y="2544784"/>
+              <a:ext cx="1497368" cy="1497368"/>
+            </a:xfrm>
+            <a:prstGeom prst="rect">
+              <a:avLst/>
+            </a:prstGeom>
+          </p:spPr>
+        </p:pic>
+      </p:grpSp>
+    </p:spTree>
+    <p:extLst>
+      <p:ext uri="{BB962C8B-B14F-4D97-AF65-F5344CB8AC3E}">
+        <p14:creationId xmlns:p14="http://schemas.microsoft.com/office/powerpoint/2010/main" val="2445770282"/>
+      </p:ext>
+    </p:extLst>
+  </p:cSld>
+  <p:clrMapOvr>
+    <a:masterClrMapping/>
+  </p:clrMapOvr>
+</p:sld>
+</file>
+
+<file path=ppt/slides/slide4.xml><?xml version="1.0" encoding="utf-8"?>
+<p:sld xmlns:a="http://schemas.openxmlformats.org/drawingml/2006/main" xmlns:r="http://schemas.openxmlformats.org/officeDocument/2006/relationships" xmlns:p="http://schemas.openxmlformats.org/presentationml/2006/main">
+  <p:cSld>
+    <p:spTree>
+      <p:nvGrpSpPr>
+        <p:cNvPr id="1" name=""/>
+        <p:cNvGrpSpPr/>
+        <p:nvPr/>
+      </p:nvGrpSpPr>
+      <p:grpSpPr>
+        <a:xfrm>
+          <a:off x="0" y="0"/>
+          <a:ext cx="0" cy="0"/>
+          <a:chOff x="0" y="0"/>
+          <a:chExt cx="0" cy="0"/>
+        </a:xfrm>
+      </p:grpSpPr>
+      <p:sp>
+        <p:nvSpPr>
+          <p:cNvPr id="3" name="Rectangle 2">
+            <a:extLst>
+              <a:ext uri="{FF2B5EF4-FFF2-40B4-BE49-F238E27FC236}">
+                <a16:creationId xmlns:a16="http://schemas.microsoft.com/office/drawing/2014/main" id="{8BEDC666-C1DB-457E-A1C7-3C10F28E97C5}"/>
+              </a:ext>
+            </a:extLst>
+          </p:cNvPr>
+          <p:cNvSpPr/>
+          <p:nvPr/>
+        </p:nvSpPr>
+        <p:spPr>
+          <a:xfrm>
+            <a:off x="5068137" y="2033470"/>
+            <a:ext cx="2520000" cy="2520000"/>
+          </a:xfrm>
+          <a:prstGeom prst="rect">
+            <a:avLst/>
+          </a:prstGeom>
+          <a:solidFill>
+            <a:schemeClr val="bg1"/>
+          </a:solidFill>
+          <a:ln>
+            <a:noFill/>
+          </a:ln>
+        </p:spPr>
+        <p:style>
+          <a:lnRef idx="2">
+            <a:schemeClr val="accent1">
+              <a:shade val="50000"/>
+            </a:schemeClr>
+          </a:lnRef>
+          <a:fillRef idx="1">
+            <a:schemeClr val="accent1"/>
+          </a:fillRef>
+          <a:effectRef idx="0">
+            <a:schemeClr val="accent1"/>
+          </a:effectRef>
+          <a:fontRef idx="minor">
+            <a:schemeClr val="lt1"/>
+          </a:fontRef>
+        </p:style>
+        <p:txBody>
+          <a:bodyPr rtlCol="0" anchor="ctr"/>
+          <a:lstStyle/>
+          <a:p>
+            <a:pPr algn="ctr"/>
+            <a:endParaRPr lang="fr-BE" dirty="0"/>
+          </a:p>
+        </p:txBody>
+      </p:sp>
       <p:pic>
         <p:nvPicPr>
-          <p:cNvPr id="4" name="Graphique 3" descr="Main ouverte">
-            <a:extLst>
-              <a:ext uri="{FF2B5EF4-FFF2-40B4-BE49-F238E27FC236}">
-                <a16:creationId xmlns:a16="http://schemas.microsoft.com/office/drawing/2014/main" id="{06387AFB-9594-4597-8F3E-72DF319DBD9B}"/>
+          <p:cNvPr id="19" name="Graphique 18" descr="Main">
+            <a:extLst>
+              <a:ext uri="{FF2B5EF4-FFF2-40B4-BE49-F238E27FC236}">
+                <a16:creationId xmlns:a16="http://schemas.microsoft.com/office/drawing/2014/main" id="{0283DAB3-5B07-45D0-B63D-679C40434566}"/>
               </a:ext>
             </a:extLst>
           </p:cNvPr>
@@ -3513,25 +4721,65 @@
               </a:ext>
             </a:extLst>
           </a:blip>
-          <a:srcRect/>
-          <a:stretch/>
+          <a:stretch>
+            <a:fillRect/>
+          </a:stretch>
         </p:blipFill>
         <p:spPr>
-          <a:xfrm>
-            <a:off x="6096000" y="2777246"/>
-            <a:ext cx="1175400" cy="1303508"/>
+          <a:xfrm rot="19822700">
+            <a:off x="6311366" y="2991947"/>
+            <a:ext cx="1098111" cy="1244362"/>
           </a:xfrm>
           <a:prstGeom prst="rect">
             <a:avLst/>
           </a:prstGeom>
         </p:spPr>
       </p:pic>
-      <p:sp>
-        <p:nvSpPr>
-          <p:cNvPr id="9" name="Arc 8">
-            <a:extLst>
-              <a:ext uri="{FF2B5EF4-FFF2-40B4-BE49-F238E27FC236}">
-                <a16:creationId xmlns:a16="http://schemas.microsoft.com/office/drawing/2014/main" id="{343183C2-E9B5-46C5-9D69-08AE733F74D9}"/>
+      <p:pic>
+        <p:nvPicPr>
+          <p:cNvPr id="22" name="Graphique 21" descr="Main">
+            <a:extLst>
+              <a:ext uri="{FF2B5EF4-FFF2-40B4-BE49-F238E27FC236}">
+                <a16:creationId xmlns:a16="http://schemas.microsoft.com/office/drawing/2014/main" id="{43A1A023-DED0-4C15-B61B-944981843921}"/>
+              </a:ext>
+            </a:extLst>
+          </p:cNvPr>
+          <p:cNvPicPr>
+            <a:picLocks noChangeAspect="1"/>
+          </p:cNvPicPr>
+          <p:nvPr/>
+        </p:nvPicPr>
+        <p:blipFill>
+          <a:blip r:embed="rId2">
+            <a:extLst>
+              <a:ext uri="{28A0092B-C50C-407E-A947-70E740481C1C}">
+                <a14:useLocalDpi xmlns:a14="http://schemas.microsoft.com/office/drawing/2010/main" val="0"/>
+              </a:ext>
+              <a:ext uri="{96DAC541-7B7A-43D3-8B79-37D633B846F1}">
+                <asvg:svgBlip xmlns:asvg="http://schemas.microsoft.com/office/drawing/2016/SVG/main" r:embed="rId3"/>
+              </a:ext>
+            </a:extLst>
+          </a:blip>
+          <a:stretch>
+            <a:fillRect/>
+          </a:stretch>
+        </p:blipFill>
+        <p:spPr>
+          <a:xfrm rot="1977567" flipH="1">
+            <a:off x="5270442" y="2991903"/>
+            <a:ext cx="1098954" cy="1245600"/>
+          </a:xfrm>
+          <a:prstGeom prst="rect">
+            <a:avLst/>
+          </a:prstGeom>
+        </p:spPr>
+      </p:pic>
+      <p:sp>
+        <p:nvSpPr>
+          <p:cNvPr id="23" name="Arc 22">
+            <a:extLst>
+              <a:ext uri="{FF2B5EF4-FFF2-40B4-BE49-F238E27FC236}">
+                <a16:creationId xmlns:a16="http://schemas.microsoft.com/office/drawing/2014/main" id="{854CE1CF-CBE1-421B-88D2-98886F4741BB}"/>
               </a:ext>
             </a:extLst>
           </p:cNvPr>
@@ -3539,22 +4787,22 @@
           <p:nvPr/>
         </p:nvSpPr>
         <p:spPr>
-          <a:xfrm rot="3755437" flipH="1">
-            <a:off x="6622861" y="2806798"/>
-            <a:ext cx="1144340" cy="592907"/>
+          <a:xfrm>
+            <a:off x="5178113" y="2793198"/>
+            <a:ext cx="515879" cy="515879"/>
           </a:xfrm>
           <a:prstGeom prst="arc">
             <a:avLst>
-              <a:gd name="adj1" fmla="val 10876382"/>
-              <a:gd name="adj2" fmla="val 4332267"/>
+              <a:gd name="adj1" fmla="val 6701258"/>
+              <a:gd name="adj2" fmla="val 0"/>
             </a:avLst>
           </a:prstGeom>
-          <a:ln w="57150">
+          <a:ln w="38100">
             <a:solidFill>
-              <a:schemeClr val="tx1"/>
+              <a:srgbClr val="404040"/>
             </a:solidFill>
-            <a:headEnd type="none" w="lg" len="lg"/>
-            <a:tailEnd type="triangle" w="lg" len="lg"/>
+            <a:headEnd type="triangle" w="med" len="med"/>
+            <a:tailEnd type="none" w="med" len="med"/>
           </a:ln>
         </p:spPr>
         <p:style>
@@ -3576,10 +4824,191 @@
           <a:lstStyle/>
           <a:p>
             <a:pPr algn="ctr"/>
-            <a:endParaRPr lang="fr-BE"/>
-          </a:p>
-        </p:txBody>
-      </p:sp>
+            <a:endParaRPr lang="fr-BE" dirty="0"/>
+          </a:p>
+        </p:txBody>
+      </p:sp>
+      <p:sp>
+        <p:nvSpPr>
+          <p:cNvPr id="25" name="Arc 24">
+            <a:extLst>
+              <a:ext uri="{FF2B5EF4-FFF2-40B4-BE49-F238E27FC236}">
+                <a16:creationId xmlns:a16="http://schemas.microsoft.com/office/drawing/2014/main" id="{DEF1CD20-5407-48CB-94BD-61B7F613436B}"/>
+              </a:ext>
+            </a:extLst>
+          </p:cNvPr>
+          <p:cNvSpPr/>
+          <p:nvPr/>
+        </p:nvSpPr>
+        <p:spPr>
+          <a:xfrm flipH="1">
+            <a:off x="7005121" y="2777591"/>
+            <a:ext cx="515879" cy="515879"/>
+          </a:xfrm>
+          <a:prstGeom prst="arc">
+            <a:avLst>
+              <a:gd name="adj1" fmla="val 6701258"/>
+              <a:gd name="adj2" fmla="val 0"/>
+            </a:avLst>
+          </a:prstGeom>
+          <a:ln w="38100">
+            <a:solidFill>
+              <a:srgbClr val="404040"/>
+            </a:solidFill>
+            <a:headEnd type="triangle" w="med" len="med"/>
+            <a:tailEnd type="none" w="med" len="med"/>
+          </a:ln>
+        </p:spPr>
+        <p:style>
+          <a:lnRef idx="1">
+            <a:schemeClr val="accent1"/>
+          </a:lnRef>
+          <a:fillRef idx="0">
+            <a:schemeClr val="accent1"/>
+          </a:fillRef>
+          <a:effectRef idx="0">
+            <a:schemeClr val="accent1"/>
+          </a:effectRef>
+          <a:fontRef idx="minor">
+            <a:schemeClr val="tx1"/>
+          </a:fontRef>
+        </p:style>
+        <p:txBody>
+          <a:bodyPr rtlCol="0" anchor="ctr"/>
+          <a:lstStyle/>
+          <a:p>
+            <a:pPr algn="ctr"/>
+            <a:endParaRPr lang="fr-BE" dirty="0"/>
+          </a:p>
+        </p:txBody>
+      </p:sp>
+      <p:grpSp>
+        <p:nvGrpSpPr>
+          <p:cNvPr id="26" name="Groupe 25">
+            <a:extLst>
+              <a:ext uri="{FF2B5EF4-FFF2-40B4-BE49-F238E27FC236}">
+                <a16:creationId xmlns:a16="http://schemas.microsoft.com/office/drawing/2014/main" id="{8C94B10C-BBB8-4497-A488-8DE32079D32F}"/>
+              </a:ext>
+            </a:extLst>
+          </p:cNvPr>
+          <p:cNvGrpSpPr/>
+          <p:nvPr/>
+        </p:nvGrpSpPr>
+        <p:grpSpPr>
+          <a:xfrm>
+            <a:off x="6111312" y="2196990"/>
+            <a:ext cx="461986" cy="461665"/>
+            <a:chOff x="6111312" y="2196990"/>
+            <a:chExt cx="461986" cy="461665"/>
+          </a:xfrm>
+        </p:grpSpPr>
+        <p:sp>
+          <p:nvSpPr>
+            <p:cNvPr id="27" name="Ellipse 26">
+              <a:extLst>
+                <a:ext uri="{FF2B5EF4-FFF2-40B4-BE49-F238E27FC236}">
+                  <a16:creationId xmlns:a16="http://schemas.microsoft.com/office/drawing/2014/main" id="{61C7E3DB-2857-491F-9E20-659EC1247503}"/>
+                </a:ext>
+              </a:extLst>
+            </p:cNvPr>
+            <p:cNvSpPr/>
+            <p:nvPr/>
+          </p:nvSpPr>
+          <p:spPr>
+            <a:xfrm>
+              <a:off x="6120765" y="2228775"/>
+              <a:ext cx="414744" cy="414744"/>
+            </a:xfrm>
+            <a:prstGeom prst="ellipse">
+              <a:avLst/>
+            </a:prstGeom>
+            <a:solidFill>
+              <a:schemeClr val="tx1">
+                <a:lumMod val="75000"/>
+                <a:lumOff val="25000"/>
+              </a:schemeClr>
+            </a:solidFill>
+            <a:ln>
+              <a:noFill/>
+            </a:ln>
+          </p:spPr>
+          <p:style>
+            <a:lnRef idx="2">
+              <a:schemeClr val="accent1">
+                <a:shade val="50000"/>
+              </a:schemeClr>
+            </a:lnRef>
+            <a:fillRef idx="1">
+              <a:schemeClr val="accent1"/>
+            </a:fillRef>
+            <a:effectRef idx="0">
+              <a:schemeClr val="accent1"/>
+            </a:effectRef>
+            <a:fontRef idx="minor">
+              <a:schemeClr val="lt1"/>
+            </a:fontRef>
+          </p:style>
+          <p:txBody>
+            <a:bodyPr rtlCol="0" anchor="ctr"/>
+            <a:lstStyle/>
+            <a:p>
+              <a:pPr algn="ctr"/>
+              <a:endParaRPr lang="fr-BE" sz="600" dirty="0">
+                <a:latin typeface="Bauhaus 93" panose="04030905020B02020C02" pitchFamily="82" charset="0"/>
+              </a:endParaRPr>
+            </a:p>
+          </p:txBody>
+        </p:sp>
+        <p:sp>
+          <p:nvSpPr>
+            <p:cNvPr id="28" name="ZoneTexte 27">
+              <a:extLst>
+                <a:ext uri="{FF2B5EF4-FFF2-40B4-BE49-F238E27FC236}">
+                  <a16:creationId xmlns:a16="http://schemas.microsoft.com/office/drawing/2014/main" id="{B1B814FA-8389-4304-A00B-84A0D7A35814}"/>
+                </a:ext>
+              </a:extLst>
+            </p:cNvPr>
+            <p:cNvSpPr txBox="1"/>
+            <p:nvPr/>
+          </p:nvSpPr>
+          <p:spPr>
+            <a:xfrm>
+              <a:off x="6111312" y="2196990"/>
+              <a:ext cx="461986" cy="461665"/>
+            </a:xfrm>
+            <a:prstGeom prst="rect">
+              <a:avLst/>
+            </a:prstGeom>
+            <a:noFill/>
+          </p:spPr>
+          <p:txBody>
+            <a:bodyPr wrap="none" rtlCol="0">
+              <a:spAutoFit/>
+            </a:bodyPr>
+            <a:lstStyle/>
+            <a:p>
+              <a:r>
+                <a:rPr lang="fr-BE" sz="1600" dirty="0">
+                  <a:solidFill>
+                    <a:schemeClr val="bg1"/>
+                  </a:solidFill>
+                  <a:latin typeface="Bauhaus 93" panose="04030905020B02020C02" pitchFamily="82" charset="0"/>
+                </a:rPr>
+                <a:t>X</a:t>
+              </a:r>
+              <a:r>
+                <a:rPr lang="fr-BE" sz="2400" dirty="0">
+                  <a:solidFill>
+                    <a:schemeClr val="bg1"/>
+                  </a:solidFill>
+                  <a:latin typeface="Bauhaus 93" panose="04030905020B02020C02" pitchFamily="82" charset="0"/>
+                </a:rPr>
+                <a:t>1</a:t>
+              </a:r>
+            </a:p>
+          </p:txBody>
+        </p:sp>
+      </p:grpSp>
     </p:spTree>
     <p:extLst>
       <p:ext uri="{BB962C8B-B14F-4D97-AF65-F5344CB8AC3E}">

</xml_diff>